<commit_message>
powerpoint with decision tree
powerpoint with decision tree
</commit_message>
<xml_diff>
--- a/Ensemble presentation [Autosaved].pptx
+++ b/Ensemble presentation [Autosaved].pptx
@@ -5,7 +5,7 @@
     <p:sldMasterId id="2147483648" r:id="rId4"/>
   </p:sldMasterIdLst>
   <p:notesMasterIdLst>
-    <p:notesMasterId r:id="rId37"/>
+    <p:notesMasterId r:id="rId39"/>
   </p:notesMasterIdLst>
   <p:sldIdLst>
     <p:sldId id="256" r:id="rId5"/>
@@ -29,17 +29,19 @@
     <p:sldId id="304" r:id="rId23"/>
     <p:sldId id="305" r:id="rId24"/>
     <p:sldId id="306" r:id="rId25"/>
-    <p:sldId id="297" r:id="rId26"/>
-    <p:sldId id="298" r:id="rId27"/>
+    <p:sldId id="308" r:id="rId26"/>
+    <p:sldId id="307" r:id="rId27"/>
     <p:sldId id="295" r:id="rId28"/>
     <p:sldId id="296" r:id="rId29"/>
-    <p:sldId id="294" r:id="rId30"/>
-    <p:sldId id="285" r:id="rId31"/>
-    <p:sldId id="276" r:id="rId32"/>
-    <p:sldId id="290" r:id="rId33"/>
-    <p:sldId id="271" r:id="rId34"/>
-    <p:sldId id="293" r:id="rId35"/>
-    <p:sldId id="260" r:id="rId36"/>
+    <p:sldId id="297" r:id="rId30"/>
+    <p:sldId id="298" r:id="rId31"/>
+    <p:sldId id="294" r:id="rId32"/>
+    <p:sldId id="285" r:id="rId33"/>
+    <p:sldId id="276" r:id="rId34"/>
+    <p:sldId id="290" r:id="rId35"/>
+    <p:sldId id="271" r:id="rId36"/>
+    <p:sldId id="293" r:id="rId37"/>
+    <p:sldId id="260" r:id="rId38"/>
   </p:sldIdLst>
   <p:sldSz cx="9144000" cy="6858000" type="screen4x3"/>
   <p:notesSz cx="6858000" cy="9144000"/>
@@ -6123,7 +6125,7 @@
           <p:cNvPr id="2" name="Title 1">
             <a:extLst>
               <a:ext uri="{FF2B5EF4-FFF2-40B4-BE49-F238E27FC236}">
-                <a16:creationId xmlns:a16="http://schemas.microsoft.com/office/drawing/2014/main" id="{9797244B-3345-4C10-9BD1-6C54B7BDAF77}"/>
+                <a16:creationId xmlns:a16="http://schemas.microsoft.com/office/drawing/2014/main" id="{DECD912A-2060-4DEE-B52A-A80DFB23F057}"/>
               </a:ext>
             </a:extLst>
           </p:cNvPr>
@@ -6141,11 +6143,7 @@
           <a:p>
             <a:r>
               <a:rPr lang="en-US" dirty="0"/>
-              <a:t>Boosting with </a:t>
-            </a:r>
-            <a:r>
-              <a:rPr lang="en-US" dirty="0" err="1"/>
-              <a:t>Adaboost</a:t>
+              <a:t>Decision Trees</a:t>
             </a:r>
             <a:endParaRPr lang="en-ZA" dirty="0"/>
           </a:p>
@@ -6156,7 +6154,7 @@
           <p:cNvPr id="5" name="Content Placeholder 4">
             <a:extLst>
               <a:ext uri="{FF2B5EF4-FFF2-40B4-BE49-F238E27FC236}">
-                <a16:creationId xmlns:a16="http://schemas.microsoft.com/office/drawing/2014/main" id="{CE007CA6-AB0F-4D4B-986D-04BBDE1D744B}"/>
+                <a16:creationId xmlns:a16="http://schemas.microsoft.com/office/drawing/2014/main" id="{5A5FA033-DC39-4825-B02B-77927CEF48F9}"/>
               </a:ext>
             </a:extLst>
           </p:cNvPr>
@@ -6189,7 +6187,7 @@
     </p:spTree>
     <p:extLst>
       <p:ext uri="{BB962C8B-B14F-4D97-AF65-F5344CB8AC3E}">
-        <p14:creationId xmlns:p14="http://schemas.microsoft.com/office/powerpoint/2010/main" val="2563637465"/>
+        <p14:creationId xmlns:p14="http://schemas.microsoft.com/office/powerpoint/2010/main" val="2575082152"/>
       </p:ext>
     </p:extLst>
   </p:cSld>
@@ -6221,7 +6219,7 @@
           <p:cNvPr id="2" name="Title 1">
             <a:extLst>
               <a:ext uri="{FF2B5EF4-FFF2-40B4-BE49-F238E27FC236}">
-                <a16:creationId xmlns:a16="http://schemas.microsoft.com/office/drawing/2014/main" id="{2567F69E-1BF6-4012-BD01-2779F4D8497C}"/>
+                <a16:creationId xmlns:a16="http://schemas.microsoft.com/office/drawing/2014/main" id="{2FC13100-A9D5-4A08-8CD5-22E253CCBE81}"/>
               </a:ext>
             </a:extLst>
           </p:cNvPr>
@@ -6239,11 +6237,7 @@
           <a:p>
             <a:r>
               <a:rPr lang="en-US" dirty="0"/>
-              <a:t>Boosting with </a:t>
-            </a:r>
-            <a:r>
-              <a:rPr lang="en-US" dirty="0" err="1"/>
-              <a:t>Adaboost</a:t>
+              <a:t>Decision Tree</a:t>
             </a:r>
             <a:endParaRPr lang="en-ZA" dirty="0"/>
           </a:p>
@@ -6254,7 +6248,7 @@
           <p:cNvPr id="5" name="Content Placeholder 4">
             <a:extLst>
               <a:ext uri="{FF2B5EF4-FFF2-40B4-BE49-F238E27FC236}">
-                <a16:creationId xmlns:a16="http://schemas.microsoft.com/office/drawing/2014/main" id="{7CCEA09C-AF71-4C2C-89AA-4B1D6755D8CE}"/>
+                <a16:creationId xmlns:a16="http://schemas.microsoft.com/office/drawing/2014/main" id="{A994A214-63CD-476D-8F6D-926C99D8E72D}"/>
               </a:ext>
             </a:extLst>
           </p:cNvPr>
@@ -6287,7 +6281,7 @@
     </p:spTree>
     <p:extLst>
       <p:ext uri="{BB962C8B-B14F-4D97-AF65-F5344CB8AC3E}">
-        <p14:creationId xmlns:p14="http://schemas.microsoft.com/office/powerpoint/2010/main" val="3546724939"/>
+        <p14:creationId xmlns:p14="http://schemas.microsoft.com/office/powerpoint/2010/main" val="1136902828"/>
       </p:ext>
     </p:extLst>
   </p:cSld>
@@ -6507,6 +6501,202 @@
           <p:cNvPr id="2" name="Title 1">
             <a:extLst>
               <a:ext uri="{FF2B5EF4-FFF2-40B4-BE49-F238E27FC236}">
+                <a16:creationId xmlns:a16="http://schemas.microsoft.com/office/drawing/2014/main" id="{9797244B-3345-4C10-9BD1-6C54B7BDAF77}"/>
+              </a:ext>
+            </a:extLst>
+          </p:cNvPr>
+          <p:cNvSpPr>
+            <a:spLocks noGrp="1"/>
+          </p:cNvSpPr>
+          <p:nvPr>
+            <p:ph type="title"/>
+          </p:nvPr>
+        </p:nvSpPr>
+        <p:spPr/>
+        <p:txBody>
+          <a:bodyPr/>
+          <a:lstStyle/>
+          <a:p>
+            <a:r>
+              <a:rPr lang="en-US" dirty="0"/>
+              <a:t>Boosting with </a:t>
+            </a:r>
+            <a:r>
+              <a:rPr lang="en-US" dirty="0" err="1"/>
+              <a:t>Adaboost</a:t>
+            </a:r>
+            <a:endParaRPr lang="en-ZA" dirty="0"/>
+          </a:p>
+        </p:txBody>
+      </p:sp>
+      <p:pic>
+        <p:nvPicPr>
+          <p:cNvPr id="5" name="Content Placeholder 4">
+            <a:extLst>
+              <a:ext uri="{FF2B5EF4-FFF2-40B4-BE49-F238E27FC236}">
+                <a16:creationId xmlns:a16="http://schemas.microsoft.com/office/drawing/2014/main" id="{CE007CA6-AB0F-4D4B-986D-04BBDE1D744B}"/>
+              </a:ext>
+            </a:extLst>
+          </p:cNvPr>
+          <p:cNvPicPr>
+            <a:picLocks noGrp="1" noChangeAspect="1"/>
+          </p:cNvPicPr>
+          <p:nvPr>
+            <p:ph idx="1"/>
+          </p:nvPr>
+        </p:nvPicPr>
+        <p:blipFill>
+          <a:blip r:embed="rId2">
+            <a:extLst>
+              <a:ext uri="{28A0092B-C50C-407E-A947-70E740481C1C}">
+                <a14:useLocalDpi xmlns:a14="http://schemas.microsoft.com/office/drawing/2010/main" val="0"/>
+              </a:ext>
+            </a:extLst>
+          </a:blip>
+          <a:stretch>
+            <a:fillRect/>
+          </a:stretch>
+        </p:blipFill>
+        <p:spPr>
+          <a:xfrm>
+            <a:off x="946087" y="1600200"/>
+            <a:ext cx="7251826" cy="4525963"/>
+          </a:xfrm>
+        </p:spPr>
+      </p:pic>
+    </p:spTree>
+    <p:extLst>
+      <p:ext uri="{BB962C8B-B14F-4D97-AF65-F5344CB8AC3E}">
+        <p14:creationId xmlns:p14="http://schemas.microsoft.com/office/powerpoint/2010/main" val="2563637465"/>
+      </p:ext>
+    </p:extLst>
+  </p:cSld>
+  <p:clrMapOvr>
+    <a:masterClrMapping/>
+  </p:clrMapOvr>
+</p:sld>
+</file>
+
+<file path=ppt/slides/slide27.xml><?xml version="1.0" encoding="utf-8"?>
+<p:sld xmlns:a="http://schemas.openxmlformats.org/drawingml/2006/main" xmlns:r="http://schemas.openxmlformats.org/officeDocument/2006/relationships" xmlns:p="http://schemas.openxmlformats.org/presentationml/2006/main">
+  <p:cSld>
+    <p:spTree>
+      <p:nvGrpSpPr>
+        <p:cNvPr id="1" name=""/>
+        <p:cNvGrpSpPr/>
+        <p:nvPr/>
+      </p:nvGrpSpPr>
+      <p:grpSpPr>
+        <a:xfrm>
+          <a:off x="0" y="0"/>
+          <a:ext cx="0" cy="0"/>
+          <a:chOff x="0" y="0"/>
+          <a:chExt cx="0" cy="0"/>
+        </a:xfrm>
+      </p:grpSpPr>
+      <p:sp>
+        <p:nvSpPr>
+          <p:cNvPr id="2" name="Title 1">
+            <a:extLst>
+              <a:ext uri="{FF2B5EF4-FFF2-40B4-BE49-F238E27FC236}">
+                <a16:creationId xmlns:a16="http://schemas.microsoft.com/office/drawing/2014/main" id="{2567F69E-1BF6-4012-BD01-2779F4D8497C}"/>
+              </a:ext>
+            </a:extLst>
+          </p:cNvPr>
+          <p:cNvSpPr>
+            <a:spLocks noGrp="1"/>
+          </p:cNvSpPr>
+          <p:nvPr>
+            <p:ph type="title"/>
+          </p:nvPr>
+        </p:nvSpPr>
+        <p:spPr/>
+        <p:txBody>
+          <a:bodyPr/>
+          <a:lstStyle/>
+          <a:p>
+            <a:r>
+              <a:rPr lang="en-US" dirty="0"/>
+              <a:t>Boosting with </a:t>
+            </a:r>
+            <a:r>
+              <a:rPr lang="en-US" dirty="0" err="1"/>
+              <a:t>Adaboost</a:t>
+            </a:r>
+            <a:endParaRPr lang="en-ZA" dirty="0"/>
+          </a:p>
+        </p:txBody>
+      </p:sp>
+      <p:pic>
+        <p:nvPicPr>
+          <p:cNvPr id="5" name="Content Placeholder 4">
+            <a:extLst>
+              <a:ext uri="{FF2B5EF4-FFF2-40B4-BE49-F238E27FC236}">
+                <a16:creationId xmlns:a16="http://schemas.microsoft.com/office/drawing/2014/main" id="{7CCEA09C-AF71-4C2C-89AA-4B1D6755D8CE}"/>
+              </a:ext>
+            </a:extLst>
+          </p:cNvPr>
+          <p:cNvPicPr>
+            <a:picLocks noGrp="1" noChangeAspect="1"/>
+          </p:cNvPicPr>
+          <p:nvPr>
+            <p:ph idx="1"/>
+          </p:nvPr>
+        </p:nvPicPr>
+        <p:blipFill>
+          <a:blip r:embed="rId2">
+            <a:extLst>
+              <a:ext uri="{28A0092B-C50C-407E-A947-70E740481C1C}">
+                <a14:useLocalDpi xmlns:a14="http://schemas.microsoft.com/office/drawing/2010/main" val="0"/>
+              </a:ext>
+            </a:extLst>
+          </a:blip>
+          <a:stretch>
+            <a:fillRect/>
+          </a:stretch>
+        </p:blipFill>
+        <p:spPr>
+          <a:xfrm>
+            <a:off x="1746376" y="1600200"/>
+            <a:ext cx="5651247" cy="4525963"/>
+          </a:xfrm>
+        </p:spPr>
+      </p:pic>
+    </p:spTree>
+    <p:extLst>
+      <p:ext uri="{BB962C8B-B14F-4D97-AF65-F5344CB8AC3E}">
+        <p14:creationId xmlns:p14="http://schemas.microsoft.com/office/powerpoint/2010/main" val="3546724939"/>
+      </p:ext>
+    </p:extLst>
+  </p:cSld>
+  <p:clrMapOvr>
+    <a:masterClrMapping/>
+  </p:clrMapOvr>
+</p:sld>
+</file>
+
+<file path=ppt/slides/slide28.xml><?xml version="1.0" encoding="utf-8"?>
+<p:sld xmlns:a="http://schemas.openxmlformats.org/drawingml/2006/main" xmlns:r="http://schemas.openxmlformats.org/officeDocument/2006/relationships" xmlns:p="http://schemas.openxmlformats.org/presentationml/2006/main">
+  <p:cSld>
+    <p:spTree>
+      <p:nvGrpSpPr>
+        <p:cNvPr id="1" name=""/>
+        <p:cNvGrpSpPr/>
+        <p:nvPr/>
+      </p:nvGrpSpPr>
+      <p:grpSpPr>
+        <a:xfrm>
+          <a:off x="0" y="0"/>
+          <a:ext cx="0" cy="0"/>
+          <a:chOff x="0" y="0"/>
+          <a:chExt cx="0" cy="0"/>
+        </a:xfrm>
+      </p:grpSpPr>
+      <p:sp>
+        <p:nvSpPr>
+          <p:cNvPr id="2" name="Title 1">
+            <a:extLst>
+              <a:ext uri="{FF2B5EF4-FFF2-40B4-BE49-F238E27FC236}">
                 <a16:creationId xmlns:a16="http://schemas.microsoft.com/office/drawing/2014/main" id="{7593AEF0-FD68-4FED-B890-3052247D4956}"/>
               </a:ext>
             </a:extLst>
@@ -6579,7 +6769,7 @@
 </p:sld>
 </file>
 
-<file path=ppt/slides/slide27.xml><?xml version="1.0" encoding="utf-8"?>
+<file path=ppt/slides/slide29.xml><?xml version="1.0" encoding="utf-8"?>
 <p:sld xmlns:a="http://schemas.openxmlformats.org/drawingml/2006/main" xmlns:r="http://schemas.openxmlformats.org/officeDocument/2006/relationships" xmlns:p="http://schemas.openxmlformats.org/presentationml/2006/main">
   <p:cSld>
     <p:spTree>
@@ -6673,7 +6863,7 @@
 </p:sld>
 </file>
 
-<file path=ppt/slides/slide28.xml><?xml version="1.0" encoding="utf-8"?>
+<file path=ppt/slides/slide3.xml><?xml version="1.0" encoding="utf-8"?>
 <p:sld xmlns:a="http://schemas.openxmlformats.org/drawingml/2006/main" xmlns:r="http://schemas.openxmlformats.org/officeDocument/2006/relationships" xmlns:p="http://schemas.openxmlformats.org/presentationml/2006/main">
   <p:cSld>
     <p:spTree>
@@ -6695,6 +6885,144 @@
           <p:cNvPr id="2" name="Title 1">
             <a:extLst>
               <a:ext uri="{FF2B5EF4-FFF2-40B4-BE49-F238E27FC236}">
+                <a16:creationId xmlns:a16="http://schemas.microsoft.com/office/drawing/2014/main" id="{3D896066-A2D1-4D5B-A718-3F60B67D4A06}"/>
+              </a:ext>
+            </a:extLst>
+          </p:cNvPr>
+          <p:cNvSpPr>
+            <a:spLocks noGrp="1"/>
+          </p:cNvSpPr>
+          <p:nvPr>
+            <p:ph type="title"/>
+          </p:nvPr>
+        </p:nvSpPr>
+        <p:spPr/>
+        <p:txBody>
+          <a:bodyPr/>
+          <a:lstStyle/>
+          <a:p>
+            <a:r>
+              <a:rPr lang="en-US" b="1" dirty="0"/>
+              <a:t>Introduction </a:t>
+            </a:r>
+            <a:endParaRPr lang="en-ZA" b="1" dirty="0"/>
+          </a:p>
+        </p:txBody>
+      </p:sp>
+      <p:sp>
+        <p:nvSpPr>
+          <p:cNvPr id="3" name="Content Placeholder 2">
+            <a:extLst>
+              <a:ext uri="{FF2B5EF4-FFF2-40B4-BE49-F238E27FC236}">
+                <a16:creationId xmlns:a16="http://schemas.microsoft.com/office/drawing/2014/main" id="{A577844C-7F48-45A8-9707-FC9FC1579A7C}"/>
+              </a:ext>
+            </a:extLst>
+          </p:cNvPr>
+          <p:cNvSpPr>
+            <a:spLocks noGrp="1"/>
+          </p:cNvSpPr>
+          <p:nvPr>
+            <p:ph idx="1"/>
+          </p:nvPr>
+        </p:nvSpPr>
+        <p:spPr/>
+        <p:txBody>
+          <a:bodyPr>
+            <a:normAutofit fontScale="85000" lnSpcReduction="20000"/>
+          </a:bodyPr>
+          <a:lstStyle/>
+          <a:p>
+            <a:r>
+              <a:rPr lang="en-US" b="0" i="0" dirty="0">
+                <a:solidFill>
+                  <a:srgbClr val="374151"/>
+                </a:solidFill>
+                <a:effectLst/>
+                <a:latin typeface="Söhne"/>
+              </a:rPr>
+              <a:t>The evolving malware threat, from viruses to ransomware and spyware, causes global security risks and financial losses. </a:t>
+            </a:r>
+          </a:p>
+          <a:p>
+            <a:endParaRPr lang="en-US" b="0" i="0" dirty="0">
+              <a:solidFill>
+                <a:srgbClr val="374151"/>
+              </a:solidFill>
+              <a:effectLst/>
+              <a:latin typeface="Söhne"/>
+            </a:endParaRPr>
+          </a:p>
+          <a:p>
+            <a:r>
+              <a:rPr lang="en-US" b="0" i="0" dirty="0">
+                <a:solidFill>
+                  <a:srgbClr val="374151"/>
+                </a:solidFill>
+                <a:effectLst/>
+                <a:latin typeface="Söhne"/>
+              </a:rPr>
+              <a:t>Detecting malware has become complex due to hackers' advanced tactics. Research fosters innovative detection approaches, aiding our understanding of malware behavior and enabling timely security updates. </a:t>
+            </a:r>
+          </a:p>
+          <a:p>
+            <a:endParaRPr lang="en-US" b="0" i="0" dirty="0">
+              <a:solidFill>
+                <a:srgbClr val="374151"/>
+              </a:solidFill>
+              <a:effectLst/>
+              <a:latin typeface="Söhne"/>
+            </a:endParaRPr>
+          </a:p>
+          <a:p>
+            <a:r>
+              <a:rPr lang="en-US" b="0" i="0" dirty="0">
+                <a:solidFill>
+                  <a:srgbClr val="374151"/>
+                </a:solidFill>
+                <a:effectLst/>
+                <a:latin typeface="Söhne"/>
+              </a:rPr>
+              <a:t>Ongoing research is essential to secure digital environments.</a:t>
+            </a:r>
+            <a:endParaRPr lang="en-ZA" dirty="0"/>
+          </a:p>
+        </p:txBody>
+      </p:sp>
+    </p:spTree>
+    <p:extLst>
+      <p:ext uri="{BB962C8B-B14F-4D97-AF65-F5344CB8AC3E}">
+        <p14:creationId xmlns:p14="http://schemas.microsoft.com/office/powerpoint/2010/main" val="1692891009"/>
+      </p:ext>
+    </p:extLst>
+  </p:cSld>
+  <p:clrMapOvr>
+    <a:masterClrMapping/>
+  </p:clrMapOvr>
+</p:sld>
+</file>
+
+<file path=ppt/slides/slide30.xml><?xml version="1.0" encoding="utf-8"?>
+<p:sld xmlns:a="http://schemas.openxmlformats.org/drawingml/2006/main" xmlns:r="http://schemas.openxmlformats.org/officeDocument/2006/relationships" xmlns:p="http://schemas.openxmlformats.org/presentationml/2006/main">
+  <p:cSld>
+    <p:spTree>
+      <p:nvGrpSpPr>
+        <p:cNvPr id="1" name=""/>
+        <p:cNvGrpSpPr/>
+        <p:nvPr/>
+      </p:nvGrpSpPr>
+      <p:grpSpPr>
+        <a:xfrm>
+          <a:off x="0" y="0"/>
+          <a:ext cx="0" cy="0"/>
+          <a:chOff x="0" y="0"/>
+          <a:chExt cx="0" cy="0"/>
+        </a:xfrm>
+      </p:grpSpPr>
+      <p:sp>
+        <p:nvSpPr>
+          <p:cNvPr id="2" name="Title 1">
+            <a:extLst>
+              <a:ext uri="{FF2B5EF4-FFF2-40B4-BE49-F238E27FC236}">
                 <a16:creationId xmlns:a16="http://schemas.microsoft.com/office/drawing/2014/main" id="{78641256-9273-4FE1-8161-0AC40EF0EEA0}"/>
               </a:ext>
             </a:extLst>
@@ -6735,14 +7063,14 @@
             <p:ph idx="1"/>
             <p:extLst>
               <p:ext uri="{D42A27DB-BD31-4B8C-83A1-F6EECF244321}">
-                <p14:modId xmlns:p14="http://schemas.microsoft.com/office/powerpoint/2010/main" val="2590433465"/>
+                <p14:modId xmlns:p14="http://schemas.microsoft.com/office/powerpoint/2010/main" val="1596509798"/>
               </p:ext>
             </p:extLst>
           </p:nvPr>
         </p:nvGraphicFramePr>
         <p:xfrm>
           <a:off x="323528" y="1600200"/>
-          <a:ext cx="8363270" cy="3931920"/>
+          <a:ext cx="8363270" cy="4576920"/>
         </p:xfrm>
         <a:graphic>
           <a:graphicData uri="http://schemas.openxmlformats.org/drawingml/2006/table">
@@ -6922,7 +7250,118 @@
                     <a:p>
                       <a:r>
                         <a:rPr lang="en-US" dirty="0"/>
-                        <a:t>1. Random Forest ensemble</a:t>
+                        <a:t>1.Decision</a:t>
+                      </a:r>
+                    </a:p>
+                    <a:p>
+                      <a:r>
+                        <a:rPr lang="en-US" dirty="0"/>
+                        <a:t> Trees</a:t>
+                      </a:r>
+                      <a:endParaRPr lang="en-ZA" dirty="0"/>
+                    </a:p>
+                  </a:txBody>
+                  <a:tcPr/>
+                </a:tc>
+                <a:tc>
+                  <a:txBody>
+                    <a:bodyPr/>
+                    <a:lstStyle/>
+                    <a:p>
+                      <a:r>
+                        <a:rPr lang="en-US" dirty="0"/>
+                        <a:t>0.9922</a:t>
+                      </a:r>
+                      <a:endParaRPr lang="en-ZA" dirty="0"/>
+                    </a:p>
+                  </a:txBody>
+                  <a:tcPr/>
+                </a:tc>
+                <a:tc>
+                  <a:txBody>
+                    <a:bodyPr/>
+                    <a:lstStyle/>
+                    <a:p>
+                      <a:r>
+                        <a:rPr lang="en-US" dirty="0"/>
+                        <a:t>0.9871</a:t>
+                      </a:r>
+                      <a:endParaRPr lang="en-ZA" dirty="0"/>
+                    </a:p>
+                  </a:txBody>
+                  <a:tcPr/>
+                </a:tc>
+                <a:tc>
+                  <a:txBody>
+                    <a:bodyPr/>
+                    <a:lstStyle/>
+                    <a:p>
+                      <a:r>
+                        <a:rPr lang="en-US" dirty="0"/>
+                        <a:t>0.9867</a:t>
+                      </a:r>
+                      <a:endParaRPr lang="en-ZA" dirty="0"/>
+                    </a:p>
+                  </a:txBody>
+                  <a:tcPr/>
+                </a:tc>
+                <a:tc>
+                  <a:txBody>
+                    <a:bodyPr/>
+                    <a:lstStyle/>
+                    <a:p>
+                      <a:r>
+                        <a:rPr lang="en-US" dirty="0"/>
+                        <a:t>0.9876</a:t>
+                      </a:r>
+                      <a:endParaRPr lang="en-ZA" dirty="0"/>
+                    </a:p>
+                  </a:txBody>
+                  <a:tcPr/>
+                </a:tc>
+                <a:tc>
+                  <a:txBody>
+                    <a:bodyPr/>
+                    <a:lstStyle/>
+                    <a:p>
+                      <a:r>
+                        <a:rPr lang="en-US" dirty="0"/>
+                        <a:t>0.9909</a:t>
+                      </a:r>
+                      <a:endParaRPr lang="en-ZA" dirty="0"/>
+                    </a:p>
+                  </a:txBody>
+                  <a:tcPr/>
+                </a:tc>
+                <a:tc>
+                  <a:txBody>
+                    <a:bodyPr/>
+                    <a:lstStyle/>
+                    <a:p>
+                      <a:r>
+                        <a:rPr lang="en-US" dirty="0"/>
+                        <a:t>0.2807</a:t>
+                      </a:r>
+                      <a:endParaRPr lang="en-ZA" dirty="0"/>
+                    </a:p>
+                  </a:txBody>
+                  <a:tcPr/>
+                </a:tc>
+                <a:extLst>
+                  <a:ext uri="{0D108BD9-81ED-4DB2-BD59-A6C34878D82A}">
+                    <a16:rowId xmlns:a16="http://schemas.microsoft.com/office/drawing/2014/main" val="2621237267"/>
+                  </a:ext>
+                </a:extLst>
+              </a:tr>
+              <a:tr h="645000">
+                <a:tc>
+                  <a:txBody>
+                    <a:bodyPr/>
+                    <a:lstStyle/>
+                    <a:p>
+                      <a:r>
+                        <a:rPr lang="en-US" dirty="0"/>
+                        <a:t>2. Random Forest ensemble</a:t>
                       </a:r>
                     </a:p>
                     <a:p>
@@ -7029,7 +7468,7 @@
                     <a:p>
                       <a:r>
                         <a:rPr lang="en-US" dirty="0"/>
-                        <a:t>2. Bagging ensemble</a:t>
+                        <a:t>3. Bagging ensemble</a:t>
                       </a:r>
                     </a:p>
                     <a:p>
@@ -7273,7 +7712,7 @@
                       </a:pPr>
                       <a:r>
                         <a:rPr lang="en-US" dirty="0"/>
-                        <a:t>3. </a:t>
+                        <a:t>4. </a:t>
                       </a:r>
                       <a:r>
                         <a:rPr lang="en-US" dirty="0" err="1"/>
@@ -7517,8 +7956,8 @@
 </p:sld>
 </file>
 
-<file path=ppt/slides/slide29.xml><?xml version="1.0" encoding="utf-8"?>
-<p:sld xmlns:a="http://schemas.openxmlformats.org/drawingml/2006/main" xmlns:r="http://schemas.openxmlformats.org/officeDocument/2006/relationships" xmlns:p="http://schemas.openxmlformats.org/presentationml/2006/main" show="0">
+<file path=ppt/slides/slide31.xml><?xml version="1.0" encoding="utf-8"?>
+<p:sld xmlns:a="http://schemas.openxmlformats.org/drawingml/2006/main" xmlns:r="http://schemas.openxmlformats.org/officeDocument/2006/relationships" xmlns:p="http://schemas.openxmlformats.org/presentationml/2006/main">
   <p:cSld>
     <p:spTree>
       <p:nvGrpSpPr>
@@ -7579,14 +8018,14 @@
             <p:ph idx="1"/>
             <p:extLst>
               <p:ext uri="{D42A27DB-BD31-4B8C-83A1-F6EECF244321}">
-                <p14:modId xmlns:p14="http://schemas.microsoft.com/office/powerpoint/2010/main" val="1423157649"/>
+                <p14:modId xmlns:p14="http://schemas.microsoft.com/office/powerpoint/2010/main" val="3398093253"/>
               </p:ext>
             </p:extLst>
           </p:nvPr>
         </p:nvGraphicFramePr>
         <p:xfrm>
           <a:off x="457200" y="1600200"/>
-          <a:ext cx="8229600" cy="3240022"/>
+          <a:ext cx="8229600" cy="4428742"/>
         </p:xfrm>
         <a:graphic>
           <a:graphicData uri="http://schemas.openxmlformats.org/drawingml/2006/table">
@@ -7689,13 +8128,13 @@
                     <a:p>
                       <a:r>
                         <a:rPr lang="en-US" dirty="0"/>
-                        <a:t>False</a:t>
+                        <a:t>Pred neg while</a:t>
                       </a:r>
                     </a:p>
                     <a:p>
                       <a:r>
                         <a:rPr lang="en-US" dirty="0"/>
-                        <a:t>negatives</a:t>
+                        <a:t>positive</a:t>
                       </a:r>
                       <a:endParaRPr lang="en-ZA" dirty="0"/>
                     </a:p>
@@ -7709,14 +8148,17 @@
                     <a:p>
                       <a:r>
                         <a:rPr lang="en-US" dirty="0"/>
-                        <a:t>False</a:t>
+                        <a:t>Pred pos while</a:t>
                       </a:r>
                     </a:p>
                     <a:p>
                       <a:r>
                         <a:rPr lang="en-US" dirty="0"/>
-                        <a:t>positives</a:t>
+                        <a:t>negative</a:t>
                       </a:r>
+                      <a:endParaRPr lang="en-ZA" dirty="0"/>
+                    </a:p>
+                    <a:p>
                       <a:endParaRPr lang="en-ZA" dirty="0"/>
                     </a:p>
                   </a:txBody>
@@ -7734,9 +8176,21 @@
                     <a:bodyPr/>
                     <a:lstStyle/>
                     <a:p>
+                      <a:pPr marL="342900" indent="-342900">
+                        <a:buAutoNum type="arabicPeriod"/>
+                      </a:pPr>
                       <a:r>
                         <a:rPr lang="en-US" dirty="0"/>
-                        <a:t>1. Random forest ensemble</a:t>
+                        <a:t>Decision</a:t>
+                      </a:r>
+                    </a:p>
+                    <a:p>
+                      <a:pPr marL="0" indent="0">
+                        <a:buNone/>
+                      </a:pPr>
+                      <a:r>
+                        <a:rPr lang="en-US" dirty="0"/>
+                        <a:t>  trees</a:t>
                       </a:r>
                       <a:endParaRPr lang="en-ZA" dirty="0"/>
                     </a:p>
@@ -7748,7 +8202,11 @@
                     <a:bodyPr/>
                     <a:lstStyle/>
                     <a:p>
-                      <a:endParaRPr lang="en-ZA"/>
+                      <a:r>
+                        <a:rPr lang="en-US" dirty="0"/>
+                        <a:t>19139</a:t>
+                      </a:r>
+                      <a:endParaRPr lang="en-ZA" dirty="0"/>
                     </a:p>
                   </a:txBody>
                   <a:tcPr/>
@@ -7758,7 +8216,11 @@
                     <a:bodyPr/>
                     <a:lstStyle/>
                     <a:p>
-                      <a:endParaRPr lang="en-ZA"/>
+                      <a:r>
+                        <a:rPr lang="en-US" dirty="0"/>
+                        <a:t>8256</a:t>
+                      </a:r>
+                      <a:endParaRPr lang="en-ZA" dirty="0"/>
                     </a:p>
                   </a:txBody>
                   <a:tcPr/>
@@ -7768,7 +8230,11 @@
                     <a:bodyPr/>
                     <a:lstStyle/>
                     <a:p>
-                      <a:endParaRPr lang="en-ZA"/>
+                      <a:r>
+                        <a:rPr lang="en-US" dirty="0"/>
+                        <a:t>104</a:t>
+                      </a:r>
+                      <a:endParaRPr lang="en-ZA" dirty="0"/>
                     </a:p>
                   </a:txBody>
                   <a:tcPr/>
@@ -7778,6 +8244,87 @@
                     <a:bodyPr/>
                     <a:lstStyle/>
                     <a:p>
+                      <a:r>
+                        <a:rPr lang="en-US" dirty="0"/>
+                        <a:t>111</a:t>
+                      </a:r>
+                      <a:endParaRPr lang="en-ZA" dirty="0"/>
+                    </a:p>
+                  </a:txBody>
+                  <a:tcPr/>
+                </a:tc>
+                <a:extLst>
+                  <a:ext uri="{0D108BD9-81ED-4DB2-BD59-A6C34878D82A}">
+                    <a16:rowId xmlns:a16="http://schemas.microsoft.com/office/drawing/2014/main" val="3683021460"/>
+                  </a:ext>
+                </a:extLst>
+              </a:tr>
+              <a:tr h="705611">
+                <a:tc>
+                  <a:txBody>
+                    <a:bodyPr/>
+                    <a:lstStyle/>
+                    <a:p>
+                      <a:r>
+                        <a:rPr lang="en-US" dirty="0"/>
+                        <a:t>2. Random forest ensemble</a:t>
+                      </a:r>
+                      <a:endParaRPr lang="en-ZA" dirty="0"/>
+                    </a:p>
+                  </a:txBody>
+                  <a:tcPr/>
+                </a:tc>
+                <a:tc>
+                  <a:txBody>
+                    <a:bodyPr/>
+                    <a:lstStyle/>
+                    <a:p>
+                      <a:r>
+                        <a:rPr lang="en-US" dirty="0"/>
+                        <a:t>19080</a:t>
+                      </a:r>
+                      <a:endParaRPr lang="en-ZA" dirty="0"/>
+                    </a:p>
+                  </a:txBody>
+                  <a:tcPr/>
+                </a:tc>
+                <a:tc>
+                  <a:txBody>
+                    <a:bodyPr/>
+                    <a:lstStyle/>
+                    <a:p>
+                      <a:r>
+                        <a:rPr lang="en-US" dirty="0"/>
+                        <a:t>8083</a:t>
+                      </a:r>
+                      <a:endParaRPr lang="en-ZA" dirty="0"/>
+                    </a:p>
+                  </a:txBody>
+                  <a:tcPr/>
+                </a:tc>
+                <a:tc>
+                  <a:txBody>
+                    <a:bodyPr/>
+                    <a:lstStyle/>
+                    <a:p>
+                      <a:r>
+                        <a:rPr lang="en-US" dirty="0"/>
+                        <a:t>277</a:t>
+                      </a:r>
+                      <a:endParaRPr lang="en-ZA" dirty="0"/>
+                    </a:p>
+                  </a:txBody>
+                  <a:tcPr/>
+                </a:tc>
+                <a:tc>
+                  <a:txBody>
+                    <a:bodyPr/>
+                    <a:lstStyle/>
+                    <a:p>
+                      <a:r>
+                        <a:rPr lang="en-US" dirty="0"/>
+                        <a:t>170</a:t>
+                      </a:r>
                       <a:endParaRPr lang="en-ZA" dirty="0"/>
                     </a:p>
                   </a:txBody>
@@ -7797,7 +8344,7 @@
                     <a:p>
                       <a:r>
                         <a:rPr lang="en-US" dirty="0"/>
-                        <a:t>2. Bagging</a:t>
+                        <a:t>3. Bagging</a:t>
                       </a:r>
                     </a:p>
                     <a:p>
@@ -7815,16 +8362,10 @@
                     <a:bodyPr/>
                     <a:lstStyle/>
                     <a:p>
-                      <a:endParaRPr lang="en-ZA"/>
-                    </a:p>
-                  </a:txBody>
-                  <a:tcPr/>
-                </a:tc>
-                <a:tc>
-                  <a:txBody>
-                    <a:bodyPr/>
-                    <a:lstStyle/>
-                    <a:p>
+                      <a:r>
+                        <a:rPr lang="en-US" dirty="0"/>
+                        <a:t>19074</a:t>
+                      </a:r>
                       <a:endParaRPr lang="en-ZA" dirty="0"/>
                     </a:p>
                   </a:txBody>
@@ -7835,7 +8376,11 @@
                     <a:bodyPr/>
                     <a:lstStyle/>
                     <a:p>
-                      <a:endParaRPr lang="en-ZA"/>
+                      <a:r>
+                        <a:rPr lang="en-US" dirty="0"/>
+                        <a:t>8082</a:t>
+                      </a:r>
+                      <a:endParaRPr lang="en-ZA" dirty="0"/>
                     </a:p>
                   </a:txBody>
                   <a:tcPr/>
@@ -7845,6 +8390,24 @@
                     <a:bodyPr/>
                     <a:lstStyle/>
                     <a:p>
+                      <a:r>
+                        <a:rPr lang="en-US" dirty="0"/>
+                        <a:t>278</a:t>
+                      </a:r>
+                      <a:endParaRPr lang="en-ZA" dirty="0"/>
+                    </a:p>
+                  </a:txBody>
+                  <a:tcPr/>
+                </a:tc>
+                <a:tc>
+                  <a:txBody>
+                    <a:bodyPr/>
+                    <a:lstStyle/>
+                    <a:p>
+                      <a:r>
+                        <a:rPr lang="en-US" dirty="0"/>
+                        <a:t>176</a:t>
+                      </a:r>
                       <a:endParaRPr lang="en-ZA" dirty="0"/>
                     </a:p>
                   </a:txBody>
@@ -7864,7 +8427,7 @@
                     <a:p>
                       <a:r>
                         <a:rPr lang="en-US" dirty="0"/>
-                        <a:t>3.</a:t>
+                        <a:t>4.</a:t>
                       </a:r>
                       <a:r>
                         <a:rPr lang="en-ZA" dirty="0"/>
@@ -7916,6 +8479,20 @@
                     <a:p>
                       <a:r>
                         <a:rPr lang="en-US" dirty="0"/>
+                        <a:t>8306</a:t>
+                      </a:r>
+                      <a:endParaRPr lang="en-ZA" dirty="0"/>
+                    </a:p>
+                  </a:txBody>
+                  <a:tcPr/>
+                </a:tc>
+                <a:tc>
+                  <a:txBody>
+                    <a:bodyPr/>
+                    <a:lstStyle/>
+                    <a:p>
+                      <a:r>
+                        <a:rPr lang="en-US" dirty="0"/>
                         <a:t>54</a:t>
                       </a:r>
                       <a:endParaRPr lang="en-ZA" dirty="0"/>
@@ -7928,16 +8505,10 @@
                     <a:bodyPr/>
                     <a:lstStyle/>
                     <a:p>
-                      <a:endParaRPr lang="en-ZA"/>
-                    </a:p>
-                  </a:txBody>
-                  <a:tcPr/>
-                </a:tc>
-                <a:tc>
-                  <a:txBody>
-                    <a:bodyPr/>
-                    <a:lstStyle/>
-                    <a:p>
+                      <a:r>
+                        <a:rPr lang="en-US" dirty="0"/>
+                        <a:t>86</a:t>
+                      </a:r>
                       <a:endParaRPr lang="en-ZA" dirty="0"/>
                     </a:p>
                   </a:txBody>
@@ -7966,7 +8537,7 @@
 </p:sld>
 </file>
 
-<file path=ppt/slides/slide3.xml><?xml version="1.0" encoding="utf-8"?>
+<file path=ppt/slides/slide32.xml><?xml version="1.0" encoding="utf-8"?>
 <p:sld xmlns:a="http://schemas.openxmlformats.org/drawingml/2006/main" xmlns:r="http://schemas.openxmlformats.org/officeDocument/2006/relationships" xmlns:p="http://schemas.openxmlformats.org/presentationml/2006/main">
   <p:cSld>
     <p:spTree>
@@ -7988,7 +8559,7 @@
           <p:cNvPr id="2" name="Title 1">
             <a:extLst>
               <a:ext uri="{FF2B5EF4-FFF2-40B4-BE49-F238E27FC236}">
-                <a16:creationId xmlns:a16="http://schemas.microsoft.com/office/drawing/2014/main" id="{3D896066-A2D1-4D5B-A718-3F60B67D4A06}"/>
+                <a16:creationId xmlns:a16="http://schemas.microsoft.com/office/drawing/2014/main" id="{F16C72EE-1B39-45EC-9354-A418F36F733C}"/>
               </a:ext>
             </a:extLst>
           </p:cNvPr>
@@ -8005,10 +8576,10 @@
           <a:lstStyle/>
           <a:p>
             <a:r>
-              <a:rPr lang="en-US" b="1" dirty="0"/>
-              <a:t>Introduction </a:t>
-            </a:r>
-            <a:endParaRPr lang="en-ZA" b="1" dirty="0"/>
+              <a:rPr lang="en-US" dirty="0"/>
+              <a:t>References</a:t>
+            </a:r>
+            <a:endParaRPr lang="en-ZA" dirty="0"/>
           </a:p>
         </p:txBody>
       </p:sp>
@@ -8017,7 +8588,7 @@
           <p:cNvPr id="3" name="Content Placeholder 2">
             <a:extLst>
               <a:ext uri="{FF2B5EF4-FFF2-40B4-BE49-F238E27FC236}">
-                <a16:creationId xmlns:a16="http://schemas.microsoft.com/office/drawing/2014/main" id="{A577844C-7F48-45A8-9707-FC9FC1579A7C}"/>
+                <a16:creationId xmlns:a16="http://schemas.microsoft.com/office/drawing/2014/main" id="{CA300724-A2FF-438A-8406-DE7C2C2F6F88}"/>
               </a:ext>
             </a:extLst>
           </p:cNvPr>
@@ -8031,62 +8602,240 @@
         <p:spPr/>
         <p:txBody>
           <a:bodyPr>
-            <a:normAutofit fontScale="85000" lnSpcReduction="20000"/>
+            <a:normAutofit fontScale="92500"/>
           </a:bodyPr>
           <a:lstStyle/>
           <a:p>
-            <a:r>
-              <a:rPr lang="en-US" b="0" i="0" dirty="0">
-                <a:solidFill>
-                  <a:srgbClr val="374151"/>
-                </a:solidFill>
+            <a:pPr marL="0" indent="0">
+              <a:lnSpc>
+                <a:spcPct val="107000"/>
+              </a:lnSpc>
+              <a:spcAft>
+                <a:spcPts val="800"/>
+              </a:spcAft>
+              <a:buNone/>
+            </a:pPr>
+            <a:endParaRPr lang="en-ZA" sz="1800" dirty="0">
+              <a:effectLst/>
+              <a:latin typeface="Calibri" panose="020F0502020204030204" pitchFamily="34" charset="0"/>
+              <a:ea typeface="Calibri" panose="020F0502020204030204" pitchFamily="34" charset="0"/>
+              <a:cs typeface="Times New Roman" panose="02020603050405020304" pitchFamily="18" charset="0"/>
+            </a:endParaRPr>
+          </a:p>
+          <a:p>
+            <a:pPr>
+              <a:lnSpc>
+                <a:spcPct val="107000"/>
+              </a:lnSpc>
+              <a:spcAft>
+                <a:spcPts val="800"/>
+              </a:spcAft>
+            </a:pPr>
+            <a:r>
+              <a:rPr lang="en-ZA" sz="1800" dirty="0">
                 <a:effectLst/>
-                <a:latin typeface="Söhne"/>
+                <a:latin typeface="Calibri" panose="020F0502020204030204" pitchFamily="34" charset="0"/>
+                <a:ea typeface="Calibri" panose="020F0502020204030204" pitchFamily="34" charset="0"/>
+                <a:cs typeface="Calibri" panose="020F0502020204030204" pitchFamily="34" charset="0"/>
               </a:rPr>
-              <a:t>The evolving malware threat, from viruses to ransomware and spyware, causes global security risks and financial losses. </a:t>
-            </a:r>
-          </a:p>
-          <a:p>
-            <a:endParaRPr lang="en-US" b="0" i="0" dirty="0">
-              <a:solidFill>
-                <a:srgbClr val="374151"/>
-              </a:solidFill>
+              <a:t>Ensemble Classifier | Data Mining - </a:t>
+            </a:r>
+            <a:r>
+              <a:rPr lang="en-ZA" sz="1800" dirty="0" err="1">
+                <a:effectLst/>
+                <a:latin typeface="Calibri" panose="020F0502020204030204" pitchFamily="34" charset="0"/>
+                <a:ea typeface="Calibri" panose="020F0502020204030204" pitchFamily="34" charset="0"/>
+                <a:cs typeface="Calibri" panose="020F0502020204030204" pitchFamily="34" charset="0"/>
+              </a:rPr>
+              <a:t>GeeksforGeeks</a:t>
+            </a:r>
+            <a:r>
+              <a:rPr lang="en-ZA" sz="1800" dirty="0">
+                <a:effectLst/>
+                <a:latin typeface="Calibri" panose="020F0502020204030204" pitchFamily="34" charset="0"/>
+                <a:ea typeface="Calibri" panose="020F0502020204030204" pitchFamily="34" charset="0"/>
+                <a:cs typeface="Calibri" panose="020F0502020204030204" pitchFamily="34" charset="0"/>
+              </a:rPr>
+              <a:t> [WWW Document], n.d. URL https://www.geeksforgeeks.org/ensemble-classifier-data-mining/ (accessed 9.13.23).</a:t>
+            </a:r>
+          </a:p>
+          <a:p>
+            <a:pPr>
+              <a:lnSpc>
+                <a:spcPct val="107000"/>
+              </a:lnSpc>
+              <a:spcAft>
+                <a:spcPts val="800"/>
+              </a:spcAft>
+            </a:pPr>
+            <a:r>
+              <a:rPr lang="en-ZA" sz="1800" dirty="0" err="1">
+                <a:effectLst/>
+                <a:latin typeface="Calibri" panose="020F0502020204030204" pitchFamily="34" charset="0"/>
+                <a:ea typeface="Calibri" panose="020F0502020204030204" pitchFamily="34" charset="0"/>
+                <a:cs typeface="Calibri" panose="020F0502020204030204" pitchFamily="34" charset="0"/>
+              </a:rPr>
+              <a:t>Mwiti</a:t>
+            </a:r>
+            <a:r>
+              <a:rPr lang="en-ZA" sz="1800" dirty="0">
+                <a:effectLst/>
+                <a:latin typeface="Calibri" panose="020F0502020204030204" pitchFamily="34" charset="0"/>
+                <a:ea typeface="Calibri" panose="020F0502020204030204" pitchFamily="34" charset="0"/>
+                <a:cs typeface="Calibri" panose="020F0502020204030204" pitchFamily="34" charset="0"/>
+              </a:rPr>
+              <a:t>, D., 2022. A Comprehensive Guide to Ensemble Learning: What Exactly Do You Need to Know [WWW Document]. neptune.ai. URL https://neptune.ai/blog/ensemble-learning-guide (accessed 9.13.23).</a:t>
+            </a:r>
+          </a:p>
+          <a:p>
+            <a:pPr>
+              <a:lnSpc>
+                <a:spcPct val="107000"/>
+              </a:lnSpc>
+              <a:spcAft>
+                <a:spcPts val="800"/>
+              </a:spcAft>
+            </a:pPr>
+            <a:r>
+              <a:rPr lang="en-ZA" sz="1800" dirty="0">
+                <a:effectLst/>
+                <a:latin typeface="Calibri" panose="020F0502020204030204" pitchFamily="34" charset="0"/>
+                <a:ea typeface="Calibri" panose="020F0502020204030204" pitchFamily="34" charset="0"/>
+                <a:cs typeface="Calibri" panose="020F0502020204030204" pitchFamily="34" charset="0"/>
+              </a:rPr>
+              <a:t>R, S.E., 2021. Understand Random Forest Algorithms With Examples (Updated 2023). Anal. Vidhya. URL https://www.analyticsvidhya.com/blog/2021/06/understanding-random-forest/ (accessed 9.13.23).</a:t>
+            </a:r>
+            <a:endParaRPr lang="en-ZA" sz="1800" dirty="0">
               <a:effectLst/>
-              <a:latin typeface="Söhne"/>
+              <a:latin typeface="Calibri" panose="020F0502020204030204" pitchFamily="34" charset="0"/>
+              <a:ea typeface="Calibri" panose="020F0502020204030204" pitchFamily="34" charset="0"/>
+              <a:cs typeface="Times New Roman" panose="02020603050405020304" pitchFamily="18" charset="0"/>
             </a:endParaRPr>
           </a:p>
           <a:p>
-            <a:r>
-              <a:rPr lang="en-US" b="0" i="0" dirty="0">
-                <a:solidFill>
-                  <a:srgbClr val="374151"/>
-                </a:solidFill>
+            <a:pPr>
+              <a:lnSpc>
+                <a:spcPct val="107000"/>
+              </a:lnSpc>
+              <a:spcAft>
+                <a:spcPts val="800"/>
+              </a:spcAft>
+            </a:pPr>
+            <a:r>
+              <a:rPr lang="en-ZA" sz="1800" dirty="0">
                 <a:effectLst/>
-                <a:latin typeface="Söhne"/>
+                <a:latin typeface="Calibri" panose="020F0502020204030204" pitchFamily="34" charset="0"/>
+                <a:ea typeface="Calibri" panose="020F0502020204030204" pitchFamily="34" charset="0"/>
+                <a:cs typeface="Calibri" panose="020F0502020204030204" pitchFamily="34" charset="0"/>
               </a:rPr>
-              <a:t>Detecting malware has become complex due to hackers' advanced tactics. Research fosters innovative detection approaches, aiding our understanding of malware behavior and enabling timely security updates. </a:t>
-            </a:r>
-          </a:p>
-          <a:p>
-            <a:endParaRPr lang="en-US" b="0" i="0" dirty="0">
-              <a:solidFill>
-                <a:srgbClr val="374151"/>
-              </a:solidFill>
+              <a:t>Random Forest® — A Powerful Ensemble Learning Algorithm [WWW Document], n.d. . </a:t>
+            </a:r>
+            <a:r>
+              <a:rPr lang="en-ZA" sz="1800" dirty="0" err="1">
+                <a:effectLst/>
+                <a:latin typeface="Calibri" panose="020F0502020204030204" pitchFamily="34" charset="0"/>
+                <a:ea typeface="Calibri" panose="020F0502020204030204" pitchFamily="34" charset="0"/>
+                <a:cs typeface="Calibri" panose="020F0502020204030204" pitchFamily="34" charset="0"/>
+              </a:rPr>
+              <a:t>KDnuggets</a:t>
+            </a:r>
+            <a:r>
+              <a:rPr lang="en-ZA" sz="1800" dirty="0">
+                <a:effectLst/>
+                <a:latin typeface="Calibri" panose="020F0502020204030204" pitchFamily="34" charset="0"/>
+                <a:ea typeface="Calibri" panose="020F0502020204030204" pitchFamily="34" charset="0"/>
+                <a:cs typeface="Calibri" panose="020F0502020204030204" pitchFamily="34" charset="0"/>
+              </a:rPr>
+              <a:t>. URL https://www.kdnuggets.com/random-forest-a-powerful-ensemble-learning-algorithm.html (accessed 9.13.23).</a:t>
+            </a:r>
+            <a:endParaRPr lang="en-ZA" sz="1800" dirty="0">
               <a:effectLst/>
-              <a:latin typeface="Söhne"/>
+              <a:latin typeface="Calibri" panose="020F0502020204030204" pitchFamily="34" charset="0"/>
+              <a:ea typeface="Calibri" panose="020F0502020204030204" pitchFamily="34" charset="0"/>
+              <a:cs typeface="Times New Roman" panose="02020603050405020304" pitchFamily="18" charset="0"/>
             </a:endParaRPr>
           </a:p>
           <a:p>
-            <a:r>
-              <a:rPr lang="en-US" b="0" i="0" dirty="0">
-                <a:solidFill>
-                  <a:srgbClr val="374151"/>
-                </a:solidFill>
-                <a:effectLst/>
-                <a:latin typeface="Söhne"/>
-              </a:rPr>
-              <a:t>Ongoing research is essential to secure digital environments.</a:t>
-            </a:r>
+            <a:pPr>
+              <a:lnSpc>
+                <a:spcPct val="107000"/>
+              </a:lnSpc>
+              <a:spcAft>
+                <a:spcPts val="800"/>
+              </a:spcAft>
+            </a:pPr>
+            <a:endParaRPr lang="en-ZA" sz="1800" dirty="0">
+              <a:effectLst/>
+              <a:latin typeface="Calibri" panose="020F0502020204030204" pitchFamily="34" charset="0"/>
+              <a:ea typeface="Calibri" panose="020F0502020204030204" pitchFamily="34" charset="0"/>
+              <a:cs typeface="Calibri" panose="020F0502020204030204" pitchFamily="34" charset="0"/>
+            </a:endParaRPr>
+          </a:p>
+          <a:p>
+            <a:pPr>
+              <a:lnSpc>
+                <a:spcPct val="107000"/>
+              </a:lnSpc>
+              <a:spcAft>
+                <a:spcPts val="800"/>
+              </a:spcAft>
+            </a:pPr>
+            <a:endParaRPr lang="en-ZA" sz="1800" dirty="0">
+              <a:effectLst/>
+              <a:latin typeface="Calibri" panose="020F0502020204030204" pitchFamily="34" charset="0"/>
+              <a:ea typeface="Calibri" panose="020F0502020204030204" pitchFamily="34" charset="0"/>
+              <a:cs typeface="Times New Roman" panose="02020603050405020304" pitchFamily="18" charset="0"/>
+            </a:endParaRPr>
+          </a:p>
+          <a:p>
+            <a:pPr>
+              <a:lnSpc>
+                <a:spcPct val="107000"/>
+              </a:lnSpc>
+              <a:spcAft>
+                <a:spcPts val="800"/>
+              </a:spcAft>
+            </a:pPr>
+            <a:endParaRPr lang="en-ZA" sz="1800" dirty="0">
+              <a:effectLst/>
+              <a:latin typeface="Calibri" panose="020F0502020204030204" pitchFamily="34" charset="0"/>
+              <a:ea typeface="Calibri" panose="020F0502020204030204" pitchFamily="34" charset="0"/>
+              <a:cs typeface="Calibri" panose="020F0502020204030204" pitchFamily="34" charset="0"/>
+            </a:endParaRPr>
+          </a:p>
+          <a:p>
+            <a:pPr>
+              <a:lnSpc>
+                <a:spcPct val="107000"/>
+              </a:lnSpc>
+              <a:spcAft>
+                <a:spcPts val="800"/>
+              </a:spcAft>
+            </a:pPr>
+            <a:endParaRPr lang="en-ZA" sz="1800" dirty="0">
+              <a:effectLst/>
+              <a:latin typeface="Calibri" panose="020F0502020204030204" pitchFamily="34" charset="0"/>
+              <a:ea typeface="Calibri" panose="020F0502020204030204" pitchFamily="34" charset="0"/>
+              <a:cs typeface="Calibri" panose="020F0502020204030204" pitchFamily="34" charset="0"/>
+            </a:endParaRPr>
+          </a:p>
+          <a:p>
+            <a:pPr>
+              <a:lnSpc>
+                <a:spcPct val="107000"/>
+              </a:lnSpc>
+              <a:spcAft>
+                <a:spcPts val="800"/>
+              </a:spcAft>
+            </a:pPr>
+            <a:endParaRPr lang="en-ZA" sz="1800" dirty="0">
+              <a:effectLst/>
+              <a:latin typeface="Calibri" panose="020F0502020204030204" pitchFamily="34" charset="0"/>
+              <a:ea typeface="Calibri" panose="020F0502020204030204" pitchFamily="34" charset="0"/>
+              <a:cs typeface="Times New Roman" panose="02020603050405020304" pitchFamily="18" charset="0"/>
+            </a:endParaRPr>
+          </a:p>
+          <a:p>
             <a:endParaRPr lang="en-ZA" dirty="0"/>
           </a:p>
         </p:txBody>
@@ -8094,7 +8843,7 @@
     </p:spTree>
     <p:extLst>
       <p:ext uri="{BB962C8B-B14F-4D97-AF65-F5344CB8AC3E}">
-        <p14:creationId xmlns:p14="http://schemas.microsoft.com/office/powerpoint/2010/main" val="1692891009"/>
+        <p14:creationId xmlns:p14="http://schemas.microsoft.com/office/powerpoint/2010/main" val="1815444816"/>
       </p:ext>
     </p:extLst>
   </p:cSld>
@@ -8104,7 +8853,7 @@
 </p:sld>
 </file>
 
-<file path=ppt/slides/slide30.xml><?xml version="1.0" encoding="utf-8"?>
+<file path=ppt/slides/slide33.xml><?xml version="1.0" encoding="utf-8"?>
 <p:sld xmlns:a="http://schemas.openxmlformats.org/drawingml/2006/main" xmlns:r="http://schemas.openxmlformats.org/officeDocument/2006/relationships" xmlns:p="http://schemas.openxmlformats.org/presentationml/2006/main">
   <p:cSld>
     <p:spTree>
@@ -8126,322 +8875,6 @@
           <p:cNvPr id="2" name="Title 1">
             <a:extLst>
               <a:ext uri="{FF2B5EF4-FFF2-40B4-BE49-F238E27FC236}">
-                <a16:creationId xmlns:a16="http://schemas.microsoft.com/office/drawing/2014/main" id="{F16C72EE-1B39-45EC-9354-A418F36F733C}"/>
-              </a:ext>
-            </a:extLst>
-          </p:cNvPr>
-          <p:cNvSpPr>
-            <a:spLocks noGrp="1"/>
-          </p:cNvSpPr>
-          <p:nvPr>
-            <p:ph type="title"/>
-          </p:nvPr>
-        </p:nvSpPr>
-        <p:spPr/>
-        <p:txBody>
-          <a:bodyPr/>
-          <a:lstStyle/>
-          <a:p>
-            <a:r>
-              <a:rPr lang="en-US" dirty="0"/>
-              <a:t>References</a:t>
-            </a:r>
-            <a:endParaRPr lang="en-ZA" dirty="0"/>
-          </a:p>
-        </p:txBody>
-      </p:sp>
-      <p:sp>
-        <p:nvSpPr>
-          <p:cNvPr id="3" name="Content Placeholder 2">
-            <a:extLst>
-              <a:ext uri="{FF2B5EF4-FFF2-40B4-BE49-F238E27FC236}">
-                <a16:creationId xmlns:a16="http://schemas.microsoft.com/office/drawing/2014/main" id="{CA300724-A2FF-438A-8406-DE7C2C2F6F88}"/>
-              </a:ext>
-            </a:extLst>
-          </p:cNvPr>
-          <p:cNvSpPr>
-            <a:spLocks noGrp="1"/>
-          </p:cNvSpPr>
-          <p:nvPr>
-            <p:ph idx="1"/>
-          </p:nvPr>
-        </p:nvSpPr>
-        <p:spPr/>
-        <p:txBody>
-          <a:bodyPr>
-            <a:normAutofit fontScale="92500"/>
-          </a:bodyPr>
-          <a:lstStyle/>
-          <a:p>
-            <a:pPr marL="0" indent="0">
-              <a:lnSpc>
-                <a:spcPct val="107000"/>
-              </a:lnSpc>
-              <a:spcAft>
-                <a:spcPts val="800"/>
-              </a:spcAft>
-              <a:buNone/>
-            </a:pPr>
-            <a:endParaRPr lang="en-ZA" sz="1800" dirty="0">
-              <a:effectLst/>
-              <a:latin typeface="Calibri" panose="020F0502020204030204" pitchFamily="34" charset="0"/>
-              <a:ea typeface="Calibri" panose="020F0502020204030204" pitchFamily="34" charset="0"/>
-              <a:cs typeface="Times New Roman" panose="02020603050405020304" pitchFamily="18" charset="0"/>
-            </a:endParaRPr>
-          </a:p>
-          <a:p>
-            <a:pPr>
-              <a:lnSpc>
-                <a:spcPct val="107000"/>
-              </a:lnSpc>
-              <a:spcAft>
-                <a:spcPts val="800"/>
-              </a:spcAft>
-            </a:pPr>
-            <a:r>
-              <a:rPr lang="en-ZA" sz="1800" dirty="0">
-                <a:effectLst/>
-                <a:latin typeface="Calibri" panose="020F0502020204030204" pitchFamily="34" charset="0"/>
-                <a:ea typeface="Calibri" panose="020F0502020204030204" pitchFamily="34" charset="0"/>
-                <a:cs typeface="Calibri" panose="020F0502020204030204" pitchFamily="34" charset="0"/>
-              </a:rPr>
-              <a:t>Ensemble Classifier | Data Mining - </a:t>
-            </a:r>
-            <a:r>
-              <a:rPr lang="en-ZA" sz="1800" dirty="0" err="1">
-                <a:effectLst/>
-                <a:latin typeface="Calibri" panose="020F0502020204030204" pitchFamily="34" charset="0"/>
-                <a:ea typeface="Calibri" panose="020F0502020204030204" pitchFamily="34" charset="0"/>
-                <a:cs typeface="Calibri" panose="020F0502020204030204" pitchFamily="34" charset="0"/>
-              </a:rPr>
-              <a:t>GeeksforGeeks</a:t>
-            </a:r>
-            <a:r>
-              <a:rPr lang="en-ZA" sz="1800" dirty="0">
-                <a:effectLst/>
-                <a:latin typeface="Calibri" panose="020F0502020204030204" pitchFamily="34" charset="0"/>
-                <a:ea typeface="Calibri" panose="020F0502020204030204" pitchFamily="34" charset="0"/>
-                <a:cs typeface="Calibri" panose="020F0502020204030204" pitchFamily="34" charset="0"/>
-              </a:rPr>
-              <a:t> [WWW Document], n.d. URL https://www.geeksforgeeks.org/ensemble-classifier-data-mining/ (accessed 9.13.23).</a:t>
-            </a:r>
-          </a:p>
-          <a:p>
-            <a:pPr>
-              <a:lnSpc>
-                <a:spcPct val="107000"/>
-              </a:lnSpc>
-              <a:spcAft>
-                <a:spcPts val="800"/>
-              </a:spcAft>
-            </a:pPr>
-            <a:r>
-              <a:rPr lang="en-ZA" sz="1800" dirty="0" err="1">
-                <a:effectLst/>
-                <a:latin typeface="Calibri" panose="020F0502020204030204" pitchFamily="34" charset="0"/>
-                <a:ea typeface="Calibri" panose="020F0502020204030204" pitchFamily="34" charset="0"/>
-                <a:cs typeface="Calibri" panose="020F0502020204030204" pitchFamily="34" charset="0"/>
-              </a:rPr>
-              <a:t>Mwiti</a:t>
-            </a:r>
-            <a:r>
-              <a:rPr lang="en-ZA" sz="1800" dirty="0">
-                <a:effectLst/>
-                <a:latin typeface="Calibri" panose="020F0502020204030204" pitchFamily="34" charset="0"/>
-                <a:ea typeface="Calibri" panose="020F0502020204030204" pitchFamily="34" charset="0"/>
-                <a:cs typeface="Calibri" panose="020F0502020204030204" pitchFamily="34" charset="0"/>
-              </a:rPr>
-              <a:t>, D., 2022. A Comprehensive Guide to Ensemble Learning: What Exactly Do You Need to Know [WWW Document]. neptune.ai. URL https://neptune.ai/blog/ensemble-learning-guide (accessed 9.13.23).</a:t>
-            </a:r>
-          </a:p>
-          <a:p>
-            <a:pPr>
-              <a:lnSpc>
-                <a:spcPct val="107000"/>
-              </a:lnSpc>
-              <a:spcAft>
-                <a:spcPts val="800"/>
-              </a:spcAft>
-            </a:pPr>
-            <a:r>
-              <a:rPr lang="en-ZA" sz="1800" dirty="0">
-                <a:effectLst/>
-                <a:latin typeface="Calibri" panose="020F0502020204030204" pitchFamily="34" charset="0"/>
-                <a:ea typeface="Calibri" panose="020F0502020204030204" pitchFamily="34" charset="0"/>
-                <a:cs typeface="Calibri" panose="020F0502020204030204" pitchFamily="34" charset="0"/>
-              </a:rPr>
-              <a:t>R, S.E., 2021. Understand Random Forest Algorithms With Examples (Updated 2023). Anal. Vidhya. URL https://www.analyticsvidhya.com/blog/2021/06/understanding-random-forest/ (accessed 9.13.23).</a:t>
-            </a:r>
-            <a:endParaRPr lang="en-ZA" sz="1800" dirty="0">
-              <a:effectLst/>
-              <a:latin typeface="Calibri" panose="020F0502020204030204" pitchFamily="34" charset="0"/>
-              <a:ea typeface="Calibri" panose="020F0502020204030204" pitchFamily="34" charset="0"/>
-              <a:cs typeface="Times New Roman" panose="02020603050405020304" pitchFamily="18" charset="0"/>
-            </a:endParaRPr>
-          </a:p>
-          <a:p>
-            <a:pPr>
-              <a:lnSpc>
-                <a:spcPct val="107000"/>
-              </a:lnSpc>
-              <a:spcAft>
-                <a:spcPts val="800"/>
-              </a:spcAft>
-            </a:pPr>
-            <a:r>
-              <a:rPr lang="en-ZA" sz="1800" dirty="0">
-                <a:effectLst/>
-                <a:latin typeface="Calibri" panose="020F0502020204030204" pitchFamily="34" charset="0"/>
-                <a:ea typeface="Calibri" panose="020F0502020204030204" pitchFamily="34" charset="0"/>
-                <a:cs typeface="Calibri" panose="020F0502020204030204" pitchFamily="34" charset="0"/>
-              </a:rPr>
-              <a:t>Random Forest® — A Powerful Ensemble Learning Algorithm [WWW Document], n.d. . </a:t>
-            </a:r>
-            <a:r>
-              <a:rPr lang="en-ZA" sz="1800" dirty="0" err="1">
-                <a:effectLst/>
-                <a:latin typeface="Calibri" panose="020F0502020204030204" pitchFamily="34" charset="0"/>
-                <a:ea typeface="Calibri" panose="020F0502020204030204" pitchFamily="34" charset="0"/>
-                <a:cs typeface="Calibri" panose="020F0502020204030204" pitchFamily="34" charset="0"/>
-              </a:rPr>
-              <a:t>KDnuggets</a:t>
-            </a:r>
-            <a:r>
-              <a:rPr lang="en-ZA" sz="1800" dirty="0">
-                <a:effectLst/>
-                <a:latin typeface="Calibri" panose="020F0502020204030204" pitchFamily="34" charset="0"/>
-                <a:ea typeface="Calibri" panose="020F0502020204030204" pitchFamily="34" charset="0"/>
-                <a:cs typeface="Calibri" panose="020F0502020204030204" pitchFamily="34" charset="0"/>
-              </a:rPr>
-              <a:t>. URL https://www.kdnuggets.com/random-forest-a-powerful-ensemble-learning-algorithm.html (accessed 9.13.23).</a:t>
-            </a:r>
-            <a:endParaRPr lang="en-ZA" sz="1800" dirty="0">
-              <a:effectLst/>
-              <a:latin typeface="Calibri" panose="020F0502020204030204" pitchFamily="34" charset="0"/>
-              <a:ea typeface="Calibri" panose="020F0502020204030204" pitchFamily="34" charset="0"/>
-              <a:cs typeface="Times New Roman" panose="02020603050405020304" pitchFamily="18" charset="0"/>
-            </a:endParaRPr>
-          </a:p>
-          <a:p>
-            <a:pPr>
-              <a:lnSpc>
-                <a:spcPct val="107000"/>
-              </a:lnSpc>
-              <a:spcAft>
-                <a:spcPts val="800"/>
-              </a:spcAft>
-            </a:pPr>
-            <a:endParaRPr lang="en-ZA" sz="1800" dirty="0">
-              <a:effectLst/>
-              <a:latin typeface="Calibri" panose="020F0502020204030204" pitchFamily="34" charset="0"/>
-              <a:ea typeface="Calibri" panose="020F0502020204030204" pitchFamily="34" charset="0"/>
-              <a:cs typeface="Calibri" panose="020F0502020204030204" pitchFamily="34" charset="0"/>
-            </a:endParaRPr>
-          </a:p>
-          <a:p>
-            <a:pPr>
-              <a:lnSpc>
-                <a:spcPct val="107000"/>
-              </a:lnSpc>
-              <a:spcAft>
-                <a:spcPts val="800"/>
-              </a:spcAft>
-            </a:pPr>
-            <a:endParaRPr lang="en-ZA" sz="1800" dirty="0">
-              <a:effectLst/>
-              <a:latin typeface="Calibri" panose="020F0502020204030204" pitchFamily="34" charset="0"/>
-              <a:ea typeface="Calibri" panose="020F0502020204030204" pitchFamily="34" charset="0"/>
-              <a:cs typeface="Times New Roman" panose="02020603050405020304" pitchFamily="18" charset="0"/>
-            </a:endParaRPr>
-          </a:p>
-          <a:p>
-            <a:pPr>
-              <a:lnSpc>
-                <a:spcPct val="107000"/>
-              </a:lnSpc>
-              <a:spcAft>
-                <a:spcPts val="800"/>
-              </a:spcAft>
-            </a:pPr>
-            <a:endParaRPr lang="en-ZA" sz="1800" dirty="0">
-              <a:effectLst/>
-              <a:latin typeface="Calibri" panose="020F0502020204030204" pitchFamily="34" charset="0"/>
-              <a:ea typeface="Calibri" panose="020F0502020204030204" pitchFamily="34" charset="0"/>
-              <a:cs typeface="Calibri" panose="020F0502020204030204" pitchFamily="34" charset="0"/>
-            </a:endParaRPr>
-          </a:p>
-          <a:p>
-            <a:pPr>
-              <a:lnSpc>
-                <a:spcPct val="107000"/>
-              </a:lnSpc>
-              <a:spcAft>
-                <a:spcPts val="800"/>
-              </a:spcAft>
-            </a:pPr>
-            <a:endParaRPr lang="en-ZA" sz="1800" dirty="0">
-              <a:effectLst/>
-              <a:latin typeface="Calibri" panose="020F0502020204030204" pitchFamily="34" charset="0"/>
-              <a:ea typeface="Calibri" panose="020F0502020204030204" pitchFamily="34" charset="0"/>
-              <a:cs typeface="Calibri" panose="020F0502020204030204" pitchFamily="34" charset="0"/>
-            </a:endParaRPr>
-          </a:p>
-          <a:p>
-            <a:pPr>
-              <a:lnSpc>
-                <a:spcPct val="107000"/>
-              </a:lnSpc>
-              <a:spcAft>
-                <a:spcPts val="800"/>
-              </a:spcAft>
-            </a:pPr>
-            <a:endParaRPr lang="en-ZA" sz="1800" dirty="0">
-              <a:effectLst/>
-              <a:latin typeface="Calibri" panose="020F0502020204030204" pitchFamily="34" charset="0"/>
-              <a:ea typeface="Calibri" panose="020F0502020204030204" pitchFamily="34" charset="0"/>
-              <a:cs typeface="Times New Roman" panose="02020603050405020304" pitchFamily="18" charset="0"/>
-            </a:endParaRPr>
-          </a:p>
-          <a:p>
-            <a:endParaRPr lang="en-ZA" dirty="0"/>
-          </a:p>
-        </p:txBody>
-      </p:sp>
-    </p:spTree>
-    <p:extLst>
-      <p:ext uri="{BB962C8B-B14F-4D97-AF65-F5344CB8AC3E}">
-        <p14:creationId xmlns:p14="http://schemas.microsoft.com/office/powerpoint/2010/main" val="1815444816"/>
-      </p:ext>
-    </p:extLst>
-  </p:cSld>
-  <p:clrMapOvr>
-    <a:masterClrMapping/>
-  </p:clrMapOvr>
-</p:sld>
-</file>
-
-<file path=ppt/slides/slide31.xml><?xml version="1.0" encoding="utf-8"?>
-<p:sld xmlns:a="http://schemas.openxmlformats.org/drawingml/2006/main" xmlns:r="http://schemas.openxmlformats.org/officeDocument/2006/relationships" xmlns:p="http://schemas.openxmlformats.org/presentationml/2006/main">
-  <p:cSld>
-    <p:spTree>
-      <p:nvGrpSpPr>
-        <p:cNvPr id="1" name=""/>
-        <p:cNvGrpSpPr/>
-        <p:nvPr/>
-      </p:nvGrpSpPr>
-      <p:grpSpPr>
-        <a:xfrm>
-          <a:off x="0" y="0"/>
-          <a:ext cx="0" cy="0"/>
-          <a:chOff x="0" y="0"/>
-          <a:chExt cx="0" cy="0"/>
-        </a:xfrm>
-      </p:grpSpPr>
-      <p:sp>
-        <p:nvSpPr>
-          <p:cNvPr id="2" name="Title 1">
-            <a:extLst>
-              <a:ext uri="{FF2B5EF4-FFF2-40B4-BE49-F238E27FC236}">
                 <a16:creationId xmlns:a16="http://schemas.microsoft.com/office/drawing/2014/main" id="{3100E1C3-D5DA-4D6B-9C3B-B47E0190121D}"/>
               </a:ext>
             </a:extLst>
@@ -8593,7 +9026,7 @@
 </p:sld>
 </file>
 
-<file path=ppt/slides/slide32.xml><?xml version="1.0" encoding="utf-8"?>
+<file path=ppt/slides/slide34.xml><?xml version="1.0" encoding="utf-8"?>
 <p:sld xmlns:a="http://schemas.openxmlformats.org/drawingml/2006/main" xmlns:r="http://schemas.openxmlformats.org/officeDocument/2006/relationships" xmlns:p="http://schemas.openxmlformats.org/presentationml/2006/main">
   <p:cSld>
     <p:spTree>

</xml_diff>